<commit_message>
Deployed e209d89 to 0.5 with MkDocs 1.1.2 and mike 1.0.0
</commit_message>
<xml_diff>
--- a/0.5/images/src/quickstart-iter8-process.pptx
+++ b/0.5/images/src/quickstart-iter8-process.pptx
@@ -197,7 +197,7 @@
           <a:p>
             <a:fld id="{38B78CBE-37FA-D241-BB4C-CAC5D3B25F49}" type="datetimeFigureOut">
               <a:rPr lang="en-US" smtClean="0"/>
-              <a:t>5/3/21</a:t>
+              <a:t>5/5/21</a:t>
             </a:fld>
             <a:endParaRPr lang="en-US"/>
           </a:p>
@@ -611,7 +611,7 @@
           <a:p>
             <a:fld id="{708812C5-0212-FD42-A0D4-E2E8FF4E3AF5}" type="datetime1">
               <a:rPr lang="en-US" smtClean="0"/>
-              <a:t>5/3/21</a:t>
+              <a:t>5/5/21</a:t>
             </a:fld>
             <a:endParaRPr lang="en-US"/>
           </a:p>
@@ -812,7 +812,7 @@
           <a:p>
             <a:fld id="{D232AC6F-41C3-B34B-9BAA-03ED2F3BC0F6}" type="datetime1">
               <a:rPr lang="en-US" smtClean="0"/>
-              <a:t>5/3/21</a:t>
+              <a:t>5/5/21</a:t>
             </a:fld>
             <a:endParaRPr lang="en-US"/>
           </a:p>
@@ -1023,7 +1023,7 @@
           <a:p>
             <a:fld id="{BEE140C2-F440-9D49-95CB-5965D64CC4A2}" type="datetime1">
               <a:rPr lang="en-US" smtClean="0"/>
-              <a:t>5/3/21</a:t>
+              <a:t>5/5/21</a:t>
             </a:fld>
             <a:endParaRPr lang="en-US"/>
           </a:p>
@@ -1224,7 +1224,7 @@
           <a:p>
             <a:fld id="{CC99F980-FB29-FD47-8508-150F73F1E8B0}" type="datetime1">
               <a:rPr lang="en-US" smtClean="0"/>
-              <a:t>5/3/21</a:t>
+              <a:t>5/5/21</a:t>
             </a:fld>
             <a:endParaRPr lang="en-US"/>
           </a:p>
@@ -1502,7 +1502,7 @@
           <a:p>
             <a:fld id="{D4510983-EA22-9643-8AC0-B3C6499B643B}" type="datetime1">
               <a:rPr lang="en-US" smtClean="0"/>
-              <a:t>5/3/21</a:t>
+              <a:t>5/5/21</a:t>
             </a:fld>
             <a:endParaRPr lang="en-US"/>
           </a:p>
@@ -1770,7 +1770,7 @@
           <a:p>
             <a:fld id="{D5A39195-967D-5D4E-8C6A-C99866996458}" type="datetime1">
               <a:rPr lang="en-US" smtClean="0"/>
-              <a:t>5/3/21</a:t>
+              <a:t>5/5/21</a:t>
             </a:fld>
             <a:endParaRPr lang="en-US"/>
           </a:p>
@@ -2185,7 +2185,7 @@
           <a:p>
             <a:fld id="{5AD771E9-C79D-684D-A158-5EB6E92DE947}" type="datetime1">
               <a:rPr lang="en-US" smtClean="0"/>
-              <a:t>5/3/21</a:t>
+              <a:t>5/5/21</a:t>
             </a:fld>
             <a:endParaRPr lang="en-US"/>
           </a:p>
@@ -2329,7 +2329,7 @@
           <a:p>
             <a:fld id="{693CA161-7E4C-5C4B-B799-DB602A0B9806}" type="datetime1">
               <a:rPr lang="en-US" smtClean="0"/>
-              <a:t>5/3/21</a:t>
+              <a:t>5/5/21</a:t>
             </a:fld>
             <a:endParaRPr lang="en-US"/>
           </a:p>
@@ -2445,7 +2445,7 @@
           <a:p>
             <a:fld id="{6D55FDF3-8BB2-6349-A5FA-057F3D78953D}" type="datetime1">
               <a:rPr lang="en-US" smtClean="0"/>
-              <a:t>5/3/21</a:t>
+              <a:t>5/5/21</a:t>
             </a:fld>
             <a:endParaRPr lang="en-US"/>
           </a:p>
@@ -2759,7 +2759,7 @@
           <a:p>
             <a:fld id="{EEDFACC0-3228-BA4B-942E-CEF38B0101FD}" type="datetime1">
               <a:rPr lang="en-US" smtClean="0"/>
-              <a:t>5/3/21</a:t>
+              <a:t>5/5/21</a:t>
             </a:fld>
             <a:endParaRPr lang="en-US"/>
           </a:p>
@@ -3050,7 +3050,7 @@
           <a:p>
             <a:fld id="{07EEEDBE-E24C-D140-B419-6D8D592D0F1C}" type="datetime1">
               <a:rPr lang="en-US" smtClean="0"/>
-              <a:t>5/3/21</a:t>
+              <a:t>5/5/21</a:t>
             </a:fld>
             <a:endParaRPr lang="en-US"/>
           </a:p>
@@ -3294,7 +3294,7 @@
           <a:p>
             <a:fld id="{E05781A2-A5EF-C54C-A3EF-F62483D37EDC}" type="datetime1">
               <a:rPr lang="en-US" smtClean="0"/>
-              <a:t>5/3/21</a:t>
+              <a:t>5/5/21</a:t>
             </a:fld>
             <a:endParaRPr lang="en-US"/>
           </a:p>
@@ -3945,35 +3945,33 @@
         <p:spPr>
           <a:xfrm>
             <a:off x="4711028" y="1675991"/>
-            <a:ext cx="1904504" cy="717177"/>
+            <a:ext cx="1568475" cy="717177"/>
           </a:xfrm>
           <a:custGeom>
             <a:avLst/>
             <a:gdLst>
-              <a:gd name="connsiteX0" fmla="*/ 0 w 1904504"/>
+              <a:gd name="connsiteX0" fmla="*/ 0 w 1568475"/>
               <a:gd name="connsiteY0" fmla="*/ 0 h 717177"/>
-              <a:gd name="connsiteX1" fmla="*/ 457081 w 1904504"/>
+              <a:gd name="connsiteX1" fmla="*/ 507140 w 1568475"/>
               <a:gd name="connsiteY1" fmla="*/ 0 h 717177"/>
-              <a:gd name="connsiteX2" fmla="*/ 933207 w 1904504"/>
+              <a:gd name="connsiteX2" fmla="*/ 1029965 w 1568475"/>
               <a:gd name="connsiteY2" fmla="*/ 0 h 717177"/>
-              <a:gd name="connsiteX3" fmla="*/ 1428378 w 1904504"/>
+              <a:gd name="connsiteX3" fmla="*/ 1568475 w 1568475"/>
               <a:gd name="connsiteY3" fmla="*/ 0 h 717177"/>
-              <a:gd name="connsiteX4" fmla="*/ 1904504 w 1904504"/>
-              <a:gd name="connsiteY4" fmla="*/ 0 h 717177"/>
-              <a:gd name="connsiteX5" fmla="*/ 1904504 w 1904504"/>
-              <a:gd name="connsiteY5" fmla="*/ 365760 h 717177"/>
-              <a:gd name="connsiteX6" fmla="*/ 1904504 w 1904504"/>
+              <a:gd name="connsiteX4" fmla="*/ 1568475 w 1568475"/>
+              <a:gd name="connsiteY4" fmla="*/ 358589 h 717177"/>
+              <a:gd name="connsiteX5" fmla="*/ 1568475 w 1568475"/>
+              <a:gd name="connsiteY5" fmla="*/ 717177 h 717177"/>
+              <a:gd name="connsiteX6" fmla="*/ 1045650 w 1568475"/>
               <a:gd name="connsiteY6" fmla="*/ 717177 h 717177"/>
-              <a:gd name="connsiteX7" fmla="*/ 1390288 w 1904504"/>
+              <a:gd name="connsiteX7" fmla="*/ 554195 w 1568475"/>
               <a:gd name="connsiteY7" fmla="*/ 717177 h 717177"/>
-              <a:gd name="connsiteX8" fmla="*/ 876072 w 1904504"/>
+              <a:gd name="connsiteX8" fmla="*/ 0 w 1568475"/>
               <a:gd name="connsiteY8" fmla="*/ 717177 h 717177"/>
-              <a:gd name="connsiteX9" fmla="*/ 0 w 1904504"/>
-              <a:gd name="connsiteY9" fmla="*/ 717177 h 717177"/>
-              <a:gd name="connsiteX10" fmla="*/ 0 w 1904504"/>
-              <a:gd name="connsiteY10" fmla="*/ 365760 h 717177"/>
-              <a:gd name="connsiteX11" fmla="*/ 0 w 1904504"/>
-              <a:gd name="connsiteY11" fmla="*/ 0 h 717177"/>
+              <a:gd name="connsiteX9" fmla="*/ 0 w 1568475"/>
+              <a:gd name="connsiteY9" fmla="*/ 365760 h 717177"/>
+              <a:gd name="connsiteX10" fmla="*/ 0 w 1568475"/>
+              <a:gd name="connsiteY10" fmla="*/ 0 h 717177"/>
             </a:gdLst>
             <a:ahLst/>
             <a:cxnLst>
@@ -4010,135 +4008,117 @@
               <a:cxn ang="0">
                 <a:pos x="connsiteX10" y="connsiteY10"/>
               </a:cxn>
-              <a:cxn ang="0">
-                <a:pos x="connsiteX11" y="connsiteY11"/>
-              </a:cxn>
             </a:cxnLst>
             <a:rect l="l" t="t" r="r" b="b"/>
             <a:pathLst>
-              <a:path w="1904504" h="717177" fill="none" extrusionOk="0">
+              <a:path w="1568475" h="717177" fill="none" extrusionOk="0">
                 <a:moveTo>
                   <a:pt x="0" y="0"/>
                 </a:moveTo>
                 <a:cubicBezTo>
-                  <a:pt x="98299" y="-13348"/>
-                  <a:pt x="246893" y="15090"/>
-                  <a:pt x="457081" y="0"/>
+                  <a:pt x="197698" y="-55765"/>
+                  <a:pt x="319313" y="51670"/>
+                  <a:pt x="507140" y="0"/>
                 </a:cubicBezTo>
                 <a:cubicBezTo>
-                  <a:pt x="667269" y="-15090"/>
-                  <a:pt x="712914" y="21346"/>
-                  <a:pt x="933207" y="0"/>
+                  <a:pt x="694967" y="-51670"/>
+                  <a:pt x="817169" y="15470"/>
+                  <a:pt x="1029965" y="0"/>
                 </a:cubicBezTo>
                 <a:cubicBezTo>
-                  <a:pt x="1153500" y="-21346"/>
-                  <a:pt x="1194290" y="53129"/>
-                  <a:pt x="1428378" y="0"/>
+                  <a:pt x="1242762" y="-15470"/>
+                  <a:pt x="1427589" y="7790"/>
+                  <a:pt x="1568475" y="0"/>
                 </a:cubicBezTo>
                 <a:cubicBezTo>
-                  <a:pt x="1662466" y="-53129"/>
-                  <a:pt x="1729499" y="23253"/>
-                  <a:pt x="1904504" y="0"/>
+                  <a:pt x="1569192" y="136556"/>
+                  <a:pt x="1564764" y="203467"/>
+                  <a:pt x="1568475" y="358589"/>
                 </a:cubicBezTo>
                 <a:cubicBezTo>
-                  <a:pt x="1925036" y="94901"/>
-                  <a:pt x="1891266" y="220272"/>
-                  <a:pt x="1904504" y="365760"/>
+                  <a:pt x="1572186" y="513711"/>
+                  <a:pt x="1534154" y="547488"/>
+                  <a:pt x="1568475" y="717177"/>
                 </a:cubicBezTo>
                 <a:cubicBezTo>
-                  <a:pt x="1917742" y="511248"/>
-                  <a:pt x="1891870" y="604435"/>
-                  <a:pt x="1904504" y="717177"/>
+                  <a:pt x="1430902" y="722946"/>
+                  <a:pt x="1240504" y="658884"/>
+                  <a:pt x="1045650" y="717177"/>
                 </a:cubicBezTo>
                 <a:cubicBezTo>
-                  <a:pt x="1785163" y="751604"/>
-                  <a:pt x="1626833" y="669802"/>
-                  <a:pt x="1390288" y="717177"/>
+                  <a:pt x="850796" y="775470"/>
+                  <a:pt x="720417" y="694179"/>
+                  <a:pt x="554195" y="717177"/>
                 </a:cubicBezTo>
                 <a:cubicBezTo>
-                  <a:pt x="1153743" y="764552"/>
-                  <a:pt x="1128363" y="671124"/>
-                  <a:pt x="876072" y="717177"/>
-                </a:cubicBezTo>
-                <a:cubicBezTo>
-                  <a:pt x="623781" y="763230"/>
-                  <a:pt x="322754" y="684503"/>
+                  <a:pt x="387973" y="740175"/>
+                  <a:pt x="182224" y="695758"/>
                   <a:pt x="0" y="717177"/>
                 </a:cubicBezTo>
                 <a:cubicBezTo>
-                  <a:pt x="-39063" y="594451"/>
-                  <a:pt x="538" y="502327"/>
+                  <a:pt x="-25141" y="637703"/>
+                  <a:pt x="9317" y="498627"/>
                   <a:pt x="0" y="365760"/>
                 </a:cubicBezTo>
                 <a:cubicBezTo>
-                  <a:pt x="-538" y="229193"/>
-                  <a:pt x="18999" y="170706"/>
+                  <a:pt x="-9317" y="232893"/>
+                  <a:pt x="25564" y="81945"/>
                   <a:pt x="0" y="0"/>
                 </a:cubicBezTo>
                 <a:close/>
               </a:path>
-              <a:path w="1904504" h="717177" stroke="0" extrusionOk="0">
+              <a:path w="1568475" h="717177" stroke="0" extrusionOk="0">
                 <a:moveTo>
                   <a:pt x="0" y="0"/>
                 </a:moveTo>
                 <a:cubicBezTo>
-                  <a:pt x="136957" y="-43813"/>
-                  <a:pt x="358887" y="25271"/>
-                  <a:pt x="457081" y="0"/>
+                  <a:pt x="125330" y="-11910"/>
+                  <a:pt x="254491" y="6817"/>
+                  <a:pt x="507140" y="0"/>
                 </a:cubicBezTo>
                 <a:cubicBezTo>
-                  <a:pt x="555275" y="-25271"/>
-                  <a:pt x="748608" y="44031"/>
-                  <a:pt x="876072" y="0"/>
+                  <a:pt x="759789" y="-6817"/>
+                  <a:pt x="836741" y="55781"/>
+                  <a:pt x="982911" y="0"/>
                 </a:cubicBezTo>
                 <a:cubicBezTo>
-                  <a:pt x="1003536" y="-44031"/>
-                  <a:pt x="1223312" y="24114"/>
-                  <a:pt x="1390288" y="0"/>
+                  <a:pt x="1129081" y="-55781"/>
+                  <a:pt x="1376640" y="47729"/>
+                  <a:pt x="1568475" y="0"/>
                 </a:cubicBezTo>
                 <a:cubicBezTo>
-                  <a:pt x="1557264" y="-24114"/>
-                  <a:pt x="1732862" y="14689"/>
-                  <a:pt x="1904504" y="0"/>
+                  <a:pt x="1589852" y="166081"/>
+                  <a:pt x="1549324" y="268087"/>
+                  <a:pt x="1568475" y="351417"/>
                 </a:cubicBezTo>
                 <a:cubicBezTo>
-                  <a:pt x="1905845" y="79747"/>
-                  <a:pt x="1876426" y="259309"/>
-                  <a:pt x="1904504" y="351417"/>
+                  <a:pt x="1587626" y="434747"/>
+                  <a:pt x="1529385" y="632867"/>
+                  <a:pt x="1568475" y="717177"/>
                 </a:cubicBezTo>
                 <a:cubicBezTo>
-                  <a:pt x="1932582" y="443525"/>
-                  <a:pt x="1874713" y="588711"/>
-                  <a:pt x="1904504" y="717177"/>
+                  <a:pt x="1327856" y="722337"/>
+                  <a:pt x="1178233" y="696314"/>
+                  <a:pt x="1077020" y="717177"/>
                 </a:cubicBezTo>
                 <a:cubicBezTo>
-                  <a:pt x="1750145" y="757776"/>
-                  <a:pt x="1526298" y="691576"/>
-                  <a:pt x="1428378" y="717177"/>
+                  <a:pt x="975807" y="738040"/>
+                  <a:pt x="707387" y="702130"/>
+                  <a:pt x="585564" y="717177"/>
                 </a:cubicBezTo>
                 <a:cubicBezTo>
-                  <a:pt x="1330458" y="742778"/>
-                  <a:pt x="1169632" y="680746"/>
-                  <a:pt x="914162" y="717177"/>
-                </a:cubicBezTo>
-                <a:cubicBezTo>
-                  <a:pt x="658692" y="753608"/>
-                  <a:pt x="630900" y="697662"/>
-                  <a:pt x="495171" y="717177"/>
-                </a:cubicBezTo>
-                <a:cubicBezTo>
-                  <a:pt x="359442" y="736692"/>
-                  <a:pt x="211663" y="681814"/>
+                  <a:pt x="463741" y="732224"/>
+                  <a:pt x="165126" y="697356"/>
                   <a:pt x="0" y="717177"/>
                 </a:cubicBezTo>
                 <a:cubicBezTo>
-                  <a:pt x="-19116" y="562504"/>
-                  <a:pt x="42260" y="484598"/>
-                  <a:pt x="0" y="358589"/>
+                  <a:pt x="-6596" y="644526"/>
+                  <a:pt x="11032" y="500252"/>
+                  <a:pt x="0" y="380104"/>
                 </a:cubicBezTo>
                 <a:cubicBezTo>
-                  <a:pt x="-42260" y="232580"/>
-                  <a:pt x="25139" y="138712"/>
+                  <a:pt x="-11032" y="259956"/>
+                  <a:pt x="1926" y="170052"/>
                   <a:pt x="0" y="0"/>
                 </a:cubicBezTo>
                 <a:close/>
@@ -4215,8 +4195,8 @@
         </p:nvSpPr>
         <p:spPr>
           <a:xfrm>
-            <a:off x="6980902" y="1063915"/>
-            <a:ext cx="1416424" cy="717177"/>
+            <a:off x="6693261" y="1093866"/>
+            <a:ext cx="1689413" cy="717177"/>
           </a:xfrm>
           <a:prstGeom prst="rect">
             <a:avLst/>
@@ -4259,7 +4239,7 @@
                   <a:schemeClr val="tx1"/>
                 </a:solidFill>
               </a:rPr>
-              <a:t>Query metrics from providers</a:t>
+              <a:t>Query metrics from New Relic and Prometheus</a:t>
             </a:r>
           </a:p>
         </p:txBody>
@@ -4278,8 +4258,8 @@
         </p:nvSpPr>
         <p:spPr>
           <a:xfrm>
-            <a:off x="6707913" y="2298984"/>
-            <a:ext cx="1962402" cy="717177"/>
+            <a:off x="6405622" y="2298984"/>
+            <a:ext cx="2264693" cy="717177"/>
           </a:xfrm>
           <a:prstGeom prst="rect">
             <a:avLst/>
@@ -4322,7 +4302,7 @@
                   <a:schemeClr val="tx1"/>
                 </a:solidFill>
               </a:rPr>
-              <a:t>Evaluate versions using statistically rigorous algorithms</a:t>
+              <a:t>Evaluate versions using statistically rigorous algorithms. Find winner</a:t>
             </a:r>
           </a:p>
         </p:txBody>
@@ -4345,8 +4325,8 @@
         </p:nvCxnSpPr>
         <p:spPr>
           <a:xfrm>
-            <a:off x="7689114" y="1781092"/>
-            <a:ext cx="0" cy="517892"/>
+            <a:off x="7537968" y="1811043"/>
+            <a:ext cx="1" cy="487941"/>
           </a:xfrm>
           <a:prstGeom prst="straightConnector1">
             <a:avLst/>
@@ -4580,19 +4560,19 @@
             </a:extLst>
           </p:cNvPr>
           <p:cNvCxnSpPr>
+            <a:cxnSpLocks/>
+            <a:stCxn id="26" idx="0"/>
             <a:endCxn id="27" idx="1"/>
           </p:cNvCxnSpPr>
           <p:nvPr/>
         </p:nvCxnSpPr>
         <p:spPr>
-          <a:xfrm flipV="1">
-            <a:off x="5663280" y="1422504"/>
-            <a:ext cx="1317622" cy="253487"/>
+          <a:xfrm rot="5400000" flipH="1" flipV="1">
+            <a:off x="5982495" y="965226"/>
+            <a:ext cx="223536" cy="1197995"/>
           </a:xfrm>
-          <a:prstGeom prst="bentConnector3">
-            <a:avLst>
-              <a:gd name="adj1" fmla="val -254"/>
-            </a:avLst>
+          <a:prstGeom prst="bentConnector2">
+            <a:avLst/>
           </a:prstGeom>
           <a:ln w="25400">
             <a:solidFill>
@@ -4634,8 +4614,8 @@
         </p:nvCxnSpPr>
         <p:spPr>
           <a:xfrm rot="10800000">
-            <a:off x="5663281" y="2393169"/>
-            <a:ext cx="1044633" cy="264405"/>
+            <a:off x="5495266" y="2393169"/>
+            <a:ext cx="910356" cy="264405"/>
           </a:xfrm>
           <a:prstGeom prst="bentConnector2">
             <a:avLst/>
@@ -4733,8 +4713,8 @@
         </p:nvSpPr>
         <p:spPr>
           <a:xfrm>
-            <a:off x="5808224" y="3947704"/>
-            <a:ext cx="3805004" cy="541816"/>
+            <a:off x="5495265" y="4084338"/>
+            <a:ext cx="4117963" cy="541816"/>
           </a:xfrm>
           <a:prstGeom prst="rect">
             <a:avLst/>
@@ -4815,7 +4795,7 @@
                 <a:ea typeface="+mn-ea"/>
                 <a:cs typeface="+mn-cs"/>
               </a:rPr>
-              <a:t>Iter8 experiment</a:t>
+              <a:t>Iter8 experiment   with A/B testing and progressive deployment</a:t>
             </a:r>
           </a:p>
         </p:txBody>
@@ -4831,14 +4811,13 @@
           </p:cNvPr>
           <p:cNvCxnSpPr>
             <a:cxnSpLocks/>
-            <a:endCxn id="34" idx="1"/>
           </p:cNvCxnSpPr>
           <p:nvPr/>
         </p:nvCxnSpPr>
         <p:spPr>
           <a:xfrm>
-            <a:off x="3962400" y="4218612"/>
-            <a:ext cx="1105996" cy="0"/>
+            <a:off x="3962400" y="4355246"/>
+            <a:ext cx="748628" cy="0"/>
           </a:xfrm>
           <a:prstGeom prst="line">
             <a:avLst/>
@@ -4883,7 +4862,7 @@
         </p:nvCxnSpPr>
         <p:spPr>
           <a:xfrm flipH="1">
-            <a:off x="9613228" y="4218612"/>
+            <a:off x="9613228" y="4355246"/>
             <a:ext cx="347944" cy="0"/>
           </a:xfrm>
           <a:prstGeom prst="line">
@@ -4940,7 +4919,7 @@
         </p:blipFill>
         <p:spPr>
           <a:xfrm>
-            <a:off x="5068396" y="3885864"/>
+            <a:off x="4738918" y="4005441"/>
             <a:ext cx="665496" cy="665496"/>
           </a:xfrm>
           <a:prstGeom prst="rect">

</xml_diff>